<commit_message>
incr fontsize poster template
</commit_message>
<xml_diff>
--- a/google-drive/week03/1Mon/2_LAsBeST TEMPLATE.pptx
+++ b/google-drive/week03/1Mon/2_LAsBeST TEMPLATE.pptx
@@ -5658,7 +5658,7 @@
                       <a:noFill/>
                       <a:extLst>
                         <a:ext uri="{909E8E84-426E-40dd-AFC4-6F175D3DCCD1}">
-                          <a14:hiddenFill xmlns:a14="http://schemas.microsoft.com/office/drawing/2010/main" xmlns="">
+                          <a14:hiddenFill xmlns="" xmlns:a14="http://schemas.microsoft.com/office/drawing/2010/main">
                             <a:solidFill>
                               <a:srgbClr val="FFFFFF"/>
                             </a:solidFill>
@@ -5944,8 +5944,8 @@
         </p:nvSpPr>
         <p:spPr bwMode="auto">
           <a:xfrm>
-            <a:off x="12190608" y="20662472"/>
-            <a:ext cx="19404916" cy="610167"/>
+            <a:off x="11532765" y="20662472"/>
+            <a:ext cx="20403501" cy="1046440"/>
           </a:xfrm>
           <a:prstGeom prst="rect">
             <a:avLst/>
@@ -5966,42 +5966,42 @@
           <a:p>
             <a:pPr eaLnBrk="1" hangingPunct="1"/>
             <a:r>
-              <a:rPr lang="en-GB" sz="1400" b="1" dirty="0">
+              <a:rPr lang="en-GB" b="1" dirty="0">
                 <a:latin typeface="Arial" panose="020B0604020202020204" pitchFamily="34" charset="0"/>
                 <a:cs typeface="Arial" pitchFamily="34" charset="0"/>
               </a:rPr>
               <a:t>Acknowledgements:</a:t>
             </a:r>
             <a:r>
-              <a:rPr lang="en-CA" sz="1400" b="1" dirty="0">
+              <a:rPr lang="en-CA" b="1" dirty="0">
                 <a:latin typeface="Arial" panose="020B0604020202020204" pitchFamily="34" charset="0"/>
                 <a:cs typeface="Arial" pitchFamily="34" charset="0"/>
               </a:rPr>
               <a:t> </a:t>
             </a:r>
             <a:r>
-              <a:rPr lang="en-CA" sz="1400" dirty="0">
+              <a:rPr lang="en-CA" dirty="0">
                 <a:latin typeface="Arial" panose="020B0604020202020204" pitchFamily="34" charset="0"/>
                 <a:cs typeface="Arial" pitchFamily="34" charset="0"/>
               </a:rPr>
               <a:t>This project was funded under the Summer Institutes in Biostatistics (SIBS) program of the National Heart, Lung, and Blood Institute and the </a:t>
             </a:r>
             <a:r>
-              <a:rPr lang="en-US" sz="1400" dirty="0">
+              <a:rPr lang="en-US" dirty="0">
                 <a:latin typeface="Arial" panose="020B0604020202020204" pitchFamily="34" charset="0"/>
                 <a:cs typeface="Arial" pitchFamily="34" charset="0"/>
               </a:rPr>
               <a:t>Institute of Allergy and Infectious Diseases </a:t>
             </a:r>
             <a:r>
-              <a:rPr lang="en-CA" sz="1400" dirty="0">
+              <a:rPr lang="en-CA" dirty="0">
                 <a:latin typeface="Arial" panose="020B0604020202020204" pitchFamily="34" charset="0"/>
                 <a:cs typeface="Arial" pitchFamily="34" charset="0"/>
               </a:rPr>
               <a:t>grant R25 HL161788, with additional support from the Dean of the Keck School of Medicine of USC, USC Norris Comprehensive Cancer Center grant # P30CA014089 </a:t>
             </a:r>
             <a:r>
-              <a:rPr lang="en-US" sz="1400" dirty="0">
+              <a:rPr lang="en-US" dirty="0">
                 <a:latin typeface="Arial" pitchFamily="34" charset="0"/>
                 <a:cs typeface="Arial" pitchFamily="34" charset="0"/>
               </a:rPr>
@@ -6010,7 +6010,7 @@
           </a:p>
           <a:p>
             <a:pPr marL="338459" eaLnBrk="1" hangingPunct="1"/>
-            <a:endParaRPr lang="en-US" sz="565" b="1" dirty="0">
+            <a:endParaRPr lang="en-US" sz="800" b="1" dirty="0">
               <a:latin typeface="Arial" pitchFamily="34" charset="0"/>
             </a:endParaRPr>
           </a:p>
@@ -6153,7 +6153,7 @@
             <a:p>
               <a:pPr algn="ctr"/>
               <a:r>
-                <a:rPr lang="en-US" sz="2259" b="1" dirty="0">
+                <a:rPr lang="en-US" sz="2800" b="1" dirty="0">
                   <a:solidFill>
                     <a:schemeClr val="tx1"/>
                   </a:solidFill>
@@ -6300,7 +6300,7 @@
             <a:p>
               <a:pPr algn="ctr"/>
               <a:r>
-                <a:rPr lang="en-US" sz="2259" b="1" dirty="0">
+                <a:rPr lang="en-US" sz="2800" b="1" dirty="0">
                   <a:solidFill>
                     <a:schemeClr val="tx1"/>
                   </a:solidFill>
@@ -6447,7 +6447,7 @@
             <a:p>
               <a:pPr algn="ctr"/>
               <a:r>
-                <a:rPr lang="en-US" sz="2259" b="1" dirty="0">
+                <a:rPr lang="en-US" sz="2800" b="1" dirty="0">
                   <a:solidFill>
                     <a:schemeClr val="tx1"/>
                   </a:solidFill>
@@ -6594,7 +6594,7 @@
             <a:p>
               <a:pPr algn="ctr"/>
               <a:r>
-                <a:rPr lang="en-US" sz="2259" b="1" dirty="0">
+                <a:rPr lang="en-US" sz="2800" b="1" dirty="0">
                   <a:solidFill>
                     <a:schemeClr val="tx1"/>
                   </a:solidFill>
@@ -6741,7 +6741,7 @@
             <a:p>
               <a:pPr algn="ctr"/>
               <a:r>
-                <a:rPr lang="en-US" sz="2259" b="1" dirty="0">
+                <a:rPr lang="en-US" sz="2800" b="1" dirty="0">
                   <a:solidFill>
                     <a:schemeClr val="tx1"/>
                   </a:solidFill>
@@ -6769,7 +6769,7 @@
         <p:spPr bwMode="auto">
           <a:xfrm>
             <a:off x="5679342" y="852707"/>
-            <a:ext cx="22301947" cy="1989712"/>
+            <a:ext cx="22301947" cy="2015103"/>
           </a:xfrm>
           <a:prstGeom prst="rect">
             <a:avLst/>
@@ -6790,7 +6790,7 @@
           <a:p>
             <a:pPr algn="ctr" eaLnBrk="1" hangingPunct="1"/>
             <a:r>
-              <a:rPr lang="en-US" sz="4235" b="1" dirty="0">
+              <a:rPr lang="en-US" sz="4400" b="1" dirty="0">
                 <a:solidFill>
                   <a:schemeClr val="bg1"/>
                 </a:solidFill>
@@ -6803,7 +6803,7 @@
           <a:p>
             <a:pPr algn="ctr" eaLnBrk="1" hangingPunct="1"/>
             <a:r>
-              <a:rPr lang="en-US" sz="3388" b="1" dirty="0">
+              <a:rPr lang="en-US" sz="3400" b="1" dirty="0">
                 <a:solidFill>
                   <a:schemeClr val="bg1"/>
                 </a:solidFill>
@@ -6811,7 +6811,7 @@
               </a:rPr>
               <a:t>Author List</a:t>
             </a:r>
-            <a:endParaRPr lang="en-US" sz="3388" b="1" baseline="30000" dirty="0">
+            <a:endParaRPr lang="en-US" sz="3400" b="1" baseline="30000" dirty="0">
               <a:solidFill>
                 <a:schemeClr val="bg1"/>
               </a:solidFill>
@@ -6830,7 +6830,7 @@
           <a:p>
             <a:pPr algn="ctr" eaLnBrk="1" hangingPunct="1"/>
             <a:r>
-              <a:rPr lang="en-US" sz="2824" b="1" dirty="0">
+              <a:rPr lang="en-US" sz="2800" b="1" dirty="0">
                 <a:solidFill>
                   <a:schemeClr val="bg1"/>
                 </a:solidFill>
@@ -6838,7 +6838,7 @@
               </a:rPr>
               <a:t>Keck School of Medicine of USC, University of Southern California, Los Angeles, CA</a:t>
             </a:r>
-            <a:endParaRPr lang="en-US" sz="2824" b="1" dirty="0">
+            <a:endParaRPr lang="en-US" sz="2800" b="1" dirty="0">
               <a:solidFill>
                 <a:schemeClr val="bg1"/>
               </a:solidFill>
@@ -6984,7 +6984,7 @@
             <a:p>
               <a:pPr algn="ctr"/>
               <a:r>
-                <a:rPr lang="en-US" sz="2259" b="1" dirty="0">
+                <a:rPr lang="en-US" sz="2800" b="1" dirty="0">
                   <a:solidFill>
                     <a:schemeClr val="tx1"/>
                   </a:solidFill>

</xml_diff>